<commit_message>
Updated subtitles on a few slides.
</commit_message>
<xml_diff>
--- a/PRES.pptx
+++ b/PRES.pptx
@@ -214,7 +214,7 @@
           <a:p>
             <a:fld id="{1558C802-E51F-AF4C-881E-8191390E349A}" type="datetimeFigureOut">
               <a:rPr lang="en-US" smtClean="0"/>
-              <a:t>2012/03/04</a:t>
+              <a:t>2012/03/05</a:t>
             </a:fld>
             <a:endParaRPr lang="en-US"/>
           </a:p>
@@ -1942,7 +1942,7 @@
             <a:pPr algn="l" eaLnBrk="1" latinLnBrk="0" hangingPunct="1"/>
             <a:fld id="{48D92626-37D2-4832-BF7A-BC283494A20D}" type="datetimeFigureOut">
               <a:rPr lang="en-US" smtClean="0"/>
-              <a:t>2012/03/04</a:t>
+              <a:t>2012/03/05</a:t>
             </a:fld>
             <a:endParaRPr lang="en-US"/>
           </a:p>
@@ -2123,7 +2123,7 @@
           <a:p>
             <a:fld id="{48D92626-37D2-4832-BF7A-BC283494A20D}" type="datetimeFigureOut">
               <a:rPr lang="en-US" smtClean="0"/>
-              <a:t>2012/03/04</a:t>
+              <a:t>2012/03/05</a:t>
             </a:fld>
             <a:endParaRPr lang="en-US"/>
           </a:p>
@@ -2291,7 +2291,7 @@
           <a:p>
             <a:fld id="{48D92626-37D2-4832-BF7A-BC283494A20D}" type="datetimeFigureOut">
               <a:rPr lang="en-US" smtClean="0"/>
-              <a:t>2012/03/04</a:t>
+              <a:t>2012/03/05</a:t>
             </a:fld>
             <a:endParaRPr lang="en-US"/>
           </a:p>
@@ -2500,7 +2500,7 @@
           <a:p>
             <a:fld id="{48D92626-37D2-4832-BF7A-BC283494A20D}" type="datetimeFigureOut">
               <a:rPr lang="en-US" smtClean="0"/>
-              <a:t>2012/03/04</a:t>
+              <a:t>2012/03/05</a:t>
             </a:fld>
             <a:endParaRPr lang="en-US"/>
           </a:p>
@@ -2775,7 +2775,7 @@
             <a:pPr algn="l" eaLnBrk="1" latinLnBrk="0" hangingPunct="1"/>
             <a:fld id="{48D92626-37D2-4832-BF7A-BC283494A20D}" type="datetimeFigureOut">
               <a:rPr lang="en-US" smtClean="0"/>
-              <a:t>2012/03/04</a:t>
+              <a:t>2012/03/05</a:t>
             </a:fld>
             <a:endParaRPr lang="en-US"/>
           </a:p>
@@ -3034,7 +3034,7 @@
           <a:p>
             <a:fld id="{48D92626-37D2-4832-BF7A-BC283494A20D}" type="datetimeFigureOut">
               <a:rPr lang="en-US" smtClean="0"/>
-              <a:t>2012/03/04</a:t>
+              <a:t>2012/03/05</a:t>
             </a:fld>
             <a:endParaRPr lang="en-US"/>
           </a:p>
@@ -3546,7 +3546,7 @@
           <a:p>
             <a:fld id="{48D92626-37D2-4832-BF7A-BC283494A20D}" type="datetimeFigureOut">
               <a:rPr lang="en-US" smtClean="0"/>
-              <a:t>2012/03/04</a:t>
+              <a:t>2012/03/05</a:t>
             </a:fld>
             <a:endParaRPr lang="en-US"/>
           </a:p>
@@ -3673,7 +3673,7 @@
           <a:p>
             <a:fld id="{48D92626-37D2-4832-BF7A-BC283494A20D}" type="datetimeFigureOut">
               <a:rPr lang="en-US" smtClean="0"/>
-              <a:t>2012/03/04</a:t>
+              <a:t>2012/03/05</a:t>
             </a:fld>
             <a:endParaRPr lang="en-US"/>
           </a:p>
@@ -3823,7 +3823,7 @@
           <a:p>
             <a:fld id="{48D92626-37D2-4832-BF7A-BC283494A20D}" type="datetimeFigureOut">
               <a:rPr lang="en-US" smtClean="0"/>
-              <a:t>2012/03/04</a:t>
+              <a:t>2012/03/05</a:t>
             </a:fld>
             <a:endParaRPr lang="en-US"/>
           </a:p>
@@ -4122,7 +4122,7 @@
             <a:pPr algn="l" eaLnBrk="1" latinLnBrk="0" hangingPunct="1"/>
             <a:fld id="{48D92626-37D2-4832-BF7A-BC283494A20D}" type="datetimeFigureOut">
               <a:rPr lang="en-US" smtClean="0"/>
-              <a:t>2012/03/04</a:t>
+              <a:t>2012/03/05</a:t>
             </a:fld>
             <a:endParaRPr lang="en-US"/>
           </a:p>
@@ -4409,7 +4409,7 @@
             <a:pPr algn="l" eaLnBrk="1" latinLnBrk="0" hangingPunct="1"/>
             <a:fld id="{48D92626-37D2-4832-BF7A-BC283494A20D}" type="datetimeFigureOut">
               <a:rPr lang="en-US" smtClean="0"/>
-              <a:t>2012/03/04</a:t>
+              <a:t>2012/03/05</a:t>
             </a:fld>
             <a:endParaRPr lang="en-US"/>
           </a:p>
@@ -4670,7 +4670,7 @@
             <a:pPr algn="l" eaLnBrk="1" latinLnBrk="0" hangingPunct="1"/>
             <a:fld id="{48D92626-37D2-4832-BF7A-BC283494A20D}" type="datetimeFigureOut">
               <a:rPr lang="en-US" smtClean="0"/>
-              <a:t>2012/03/04</a:t>
+              <a:t>2012/03/05</a:t>
             </a:fld>
             <a:endParaRPr lang="en-US" sz="1300" dirty="0">
               <a:solidFill>
@@ -5240,6 +5240,13 @@
   <p:clrMapOvr>
     <a:masterClrMapping/>
   </p:clrMapOvr>
+  <p:timing>
+    <p:tnLst>
+      <p:par>
+        <p:cTn xmlns:p14="http://schemas.microsoft.com/office/powerpoint/2010/main" id="1" dur="indefinite" restart="never" nodeType="tmRoot"/>
+      </p:par>
+    </p:tnLst>
+  </p:timing>
 </p:sld>
 </file>
 
@@ -6356,6 +6363,13 @@
   <p:clrMapOvr>
     <a:masterClrMapping/>
   </p:clrMapOvr>
+  <p:timing>
+    <p:tnLst>
+      <p:par>
+        <p:cTn xmlns:p14="http://schemas.microsoft.com/office/powerpoint/2010/main" id="1" dur="indefinite" restart="never" nodeType="tmRoot"/>
+      </p:par>
+    </p:tnLst>
+  </p:timing>
 </p:sld>
 </file>
 
@@ -6833,6 +6847,13 @@
   <p:clrMapOvr>
     <a:masterClrMapping/>
   </p:clrMapOvr>
+  <p:timing>
+    <p:tnLst>
+      <p:par>
+        <p:cTn xmlns:p14="http://schemas.microsoft.com/office/powerpoint/2010/main" id="1" dur="indefinite" restart="never" nodeType="tmRoot"/>
+      </p:par>
+    </p:tnLst>
+  </p:timing>
 </p:sld>
 </file>
 
@@ -6891,10 +6912,6 @@
           <a:bodyPr/>
           <a:lstStyle/>
           <a:p>
-            <a:r>
-              <a:rPr lang="en-US" dirty="0" smtClean="0"/>
-              <a:t>Movement &amp; Navigation</a:t>
-            </a:r>
             <a:endParaRPr lang="en-US" dirty="0"/>
           </a:p>
         </p:txBody>
@@ -6958,6 +6975,13 @@
   <p:clrMapOvr>
     <a:masterClrMapping/>
   </p:clrMapOvr>
+  <p:timing>
+    <p:tnLst>
+      <p:par>
+        <p:cTn xmlns:p14="http://schemas.microsoft.com/office/powerpoint/2010/main" id="1" dur="indefinite" restart="never" nodeType="tmRoot"/>
+      </p:par>
+    </p:tnLst>
+  </p:timing>
 </p:sld>
 </file>
 
@@ -7057,6 +7081,13 @@
   <p:clrMapOvr>
     <a:masterClrMapping/>
   </p:clrMapOvr>
+  <p:timing>
+    <p:tnLst>
+      <p:par>
+        <p:cTn xmlns:p14="http://schemas.microsoft.com/office/powerpoint/2010/main" id="1" dur="indefinite" restart="never" nodeType="tmRoot"/>
+      </p:par>
+    </p:tnLst>
+  </p:timing>
 </p:sld>
 </file>
 
@@ -7156,6 +7187,13 @@
   <p:clrMapOvr>
     <a:masterClrMapping/>
   </p:clrMapOvr>
+  <p:timing>
+    <p:tnLst>
+      <p:par>
+        <p:cTn xmlns:p14="http://schemas.microsoft.com/office/powerpoint/2010/main" id="1" dur="indefinite" restart="never" nodeType="tmRoot"/>
+      </p:par>
+    </p:tnLst>
+  </p:timing>
 </p:sld>
 </file>
 
@@ -7260,6 +7298,13 @@
   <p:clrMapOvr>
     <a:masterClrMapping/>
   </p:clrMapOvr>
+  <p:timing>
+    <p:tnLst>
+      <p:par>
+        <p:cTn xmlns:p14="http://schemas.microsoft.com/office/powerpoint/2010/main" id="1" dur="indefinite" restart="never" nodeType="tmRoot"/>
+      </p:par>
+    </p:tnLst>
+  </p:timing>
 </p:sld>
 </file>
 

</xml_diff>